<commit_message>
update presentation - add the trello link as a note
</commit_message>
<xml_diff>
--- a/Quickbase_CandidateExercise_Presentation_Ilia_Todorov.pptx
+++ b/Quickbase_CandidateExercise_Presentation_Ilia_Todorov.pptx
@@ -256,7 +256,7 @@
       <p15:sldGuideLst xmlns:p15="http://schemas.microsoft.com/office/powerpoint/2012/main"/>
     </p:ext>
     <p:ext uri="http://customooxmlschemas.google.com/">
-      <go:slidesCustomData xmlns:mc="http://schemas.openxmlformats.org/markup-compatibility/2006" xmlns:mv="urn:schemas-microsoft-com:mac:vml" xmlns:c="http://schemas.openxmlformats.org/drawingml/2006/chart" xmlns:dgm="http://schemas.openxmlformats.org/drawingml/2006/diagram" xmlns:o="urn:schemas-microsoft-com:office:office" xmlns:v="urn:schemas-microsoft-com:vml" xmlns:pvml="urn:schemas-microsoft-com:office:powerpoint" xmlns:com="http://schemas.openxmlformats.org/drawingml/2006/compatibility" xmlns:p14="http://schemas.microsoft.com/office/powerpoint/2010/main" xmlns:p15="http://schemas.microsoft.com/office/powerpoint/2012/main" xmlns:ahyp="http://schemas.microsoft.com/office/drawing/2018/hyperlinkcolor" xmlns:go="http://customooxmlschemas.google.com/" xmlns="" r:id="rId28" roundtripDataSignature="AMtx7mgcW9ILYHuO+M53hgQaaLzLMQE2KA=="/>
+      <go:slidesCustomData xmlns="" xmlns:go="http://customooxmlschemas.google.com/" xmlns:ahyp="http://schemas.microsoft.com/office/drawing/2018/hyperlinkcolor" xmlns:p15="http://schemas.microsoft.com/office/powerpoint/2012/main" xmlns:p14="http://schemas.microsoft.com/office/powerpoint/2010/main" xmlns:com="http://schemas.openxmlformats.org/drawingml/2006/compatibility" xmlns:pvml="urn:schemas-microsoft-com:office:powerpoint" xmlns:v="urn:schemas-microsoft-com:vml" xmlns:o="urn:schemas-microsoft-com:office:office" xmlns:dgm="http://schemas.openxmlformats.org/drawingml/2006/diagram" xmlns:c="http://schemas.openxmlformats.org/drawingml/2006/chart" xmlns:mv="urn:schemas-microsoft-com:mac:vml" xmlns:mc="http://schemas.openxmlformats.org/markup-compatibility/2006" r:id="rId28" roundtripDataSignature="AMtx7mgcW9ILYHuO+M53hgQaaLzLMQE2KA=="/>
     </p:ext>
   </p:extLst>
 </p:presentation>
@@ -2643,7 +2643,35 @@
               </a:spcAft>
               <a:buNone/>
             </a:pPr>
-            <a:endParaRPr/>
+            <a:r>
+              <a:rPr lang="en-US" dirty="0"/>
+              <a:t>Trello: https://</a:t>
+            </a:r>
+            <a:r>
+              <a:rPr lang="en-US" dirty="0" err="1"/>
+              <a:t>trello.com</a:t>
+            </a:r>
+            <a:r>
+              <a:rPr lang="en-US" dirty="0"/>
+              <a:t>/b/</a:t>
+            </a:r>
+            <a:r>
+              <a:rPr lang="en-US" dirty="0" err="1"/>
+              <a:t>LHhLuDQv</a:t>
+            </a:r>
+            <a:r>
+              <a:rPr lang="en-US" dirty="0"/>
+              <a:t>/</a:t>
+            </a:r>
+            <a:r>
+              <a:rPr lang="en-US" dirty="0" err="1"/>
+              <a:t>quickbase</a:t>
+            </a:r>
+            <a:r>
+              <a:rPr lang="en-US" dirty="0"/>
+              <a:t>-interview</a:t>
+            </a:r>
+            <a:endParaRPr dirty="0"/>
           </a:p>
         </p:txBody>
       </p:sp>
@@ -45729,7 +45757,7 @@
           <a:p>
             <a:pPr lvl="1"/>
             <a:r>
-              <a:rPr lang="en-US"/>
+              <a:rPr lang="en-US" dirty="0"/>
               <a:t>Chose technology</a:t>
             </a:r>
           </a:p>

</xml_diff>